<commit_message>
update Cây con trỏ
</commit_message>
<xml_diff>
--- a/ctdlgt/Tree.pptx
+++ b/ctdlgt/Tree.pptx
@@ -14,6 +14,7 @@
     <p:sldId id="262" r:id="rId8"/>
     <p:sldId id="263" r:id="rId9"/>
     <p:sldId id="264" r:id="rId10"/>
+    <p:sldId id="265" r:id="rId11"/>
   </p:sldIdLst>
   <p:sldSz cx="9144000" cy="6858000" type="screen4x3"/>
   <p:notesSz cx="6858000" cy="9144000"/>
@@ -3631,6 +3632,63 @@
           </a:p>
         </p:txBody>
       </p:sp>
+    </p:spTree>
+  </p:cSld>
+  <p:clrMapOvr>
+    <a:masterClrMapping/>
+  </p:clrMapOvr>
+  <p:timing>
+    <p:tnLst>
+      <p:par>
+        <p:cTn id="1" dur="indefinite" restart="never" nodeType="tmRoot"/>
+      </p:par>
+    </p:tnLst>
+  </p:timing>
+</p:sld>
+</file>
+
+<file path=ppt/slides/slide10.xml><?xml version="1.0" encoding="utf-8"?>
+<p:sld xmlns:a="http://schemas.openxmlformats.org/drawingml/2006/main" xmlns:r="http://schemas.openxmlformats.org/officeDocument/2006/relationships" xmlns:p="http://schemas.openxmlformats.org/presentationml/2006/main">
+  <p:cSld>
+    <p:spTree>
+      <p:nvGrpSpPr>
+        <p:cNvPr id="1" name=""/>
+        <p:cNvGrpSpPr/>
+        <p:nvPr/>
+      </p:nvGrpSpPr>
+      <p:grpSpPr>
+        <a:xfrm>
+          <a:off x="0" y="0"/>
+          <a:ext cx="0" cy="0"/>
+          <a:chOff x="0" y="0"/>
+          <a:chExt cx="0" cy="0"/>
+        </a:xfrm>
+      </p:grpSpPr>
+      <p:pic>
+        <p:nvPicPr>
+          <p:cNvPr id="1026" name="Picture 2" descr="C:\Users\ThanBaiKS\Desktop\tree_pointer.png"/>
+          <p:cNvPicPr>
+            <a:picLocks noChangeAspect="1" noChangeArrowheads="1"/>
+          </p:cNvPicPr>
+          <p:nvPr/>
+        </p:nvPicPr>
+        <p:blipFill>
+          <a:blip r:embed="rId2"/>
+          <a:stretch>
+            <a:fillRect/>
+          </a:stretch>
+        </p:blipFill>
+        <p:spPr bwMode="auto">
+          <a:xfrm>
+            <a:off x="1409032" y="533400"/>
+            <a:ext cx="6259260" cy="6040186"/>
+          </a:xfrm>
+          <a:prstGeom prst="rect">
+            <a:avLst/>
+          </a:prstGeom>
+          <a:noFill/>
+        </p:spPr>
+      </p:pic>
     </p:spTree>
   </p:cSld>
   <p:clrMapOvr>
@@ -5361,11 +5419,7 @@
             </a:br>
             <a:r>
               <a:rPr lang="en-US" smtClean="0"/>
-              <a:t>Cây biểu diễn </a:t>
-            </a:r>
-            <a:r>
-              <a:rPr lang="en-US" smtClean="0"/>
-              <a:t>bởi con trỏ</a:t>
+              <a:t>Cây biểu diễn bởi con trỏ</a:t>
             </a:r>
             <a:endParaRPr lang="en-US"/>
           </a:p>
@@ -5397,15 +5451,7 @@
                 <a:ea typeface="Tahoma" pitchFamily="34" charset="0"/>
                 <a:cs typeface="Tahoma" pitchFamily="34" charset="0"/>
               </a:rPr>
-              <a:t>Với cách biểu diễn cây bằng con trỏ, mỗi node sẽ bao gồ</a:t>
-            </a:r>
-            <a:r>
-              <a:rPr lang="en-US" sz="2000" smtClean="0">
-                <a:latin typeface="Tahoma" pitchFamily="34" charset="0"/>
-                <a:ea typeface="Tahoma" pitchFamily="34" charset="0"/>
-                <a:cs typeface="Tahoma" pitchFamily="34" charset="0"/>
-              </a:rPr>
-              <a:t>m những</a:t>
+              <a:t>Với cách biểu diễn cây bằng con trỏ, mỗi node sẽ bao gồm những</a:t>
             </a:r>
           </a:p>
           <a:p>
@@ -5472,11 +5518,6 @@
               </a:rPr>
               <a:t>	</a:t>
             </a:r>
-            <a:endParaRPr lang="en-US" sz="2000" smtClean="0">
-              <a:latin typeface="Tahoma" pitchFamily="34" charset="0"/>
-              <a:ea typeface="Tahoma" pitchFamily="34" charset="0"/>
-              <a:cs typeface="Tahoma" pitchFamily="34" charset="0"/>
-            </a:endParaRPr>
           </a:p>
         </p:txBody>
       </p:sp>

</xml_diff>